<commit_message>
cleaned up slide aesthetic
</commit_message>
<xml_diff>
--- a/Carlos_work/UFO_Sighting Presentation_C_slides.pptx
+++ b/Carlos_work/UFO_Sighting Presentation_C_slides.pptx
@@ -6283,8 +6283,128 @@
           <a:prstGeom prst="rect">
             <a:avLst/>
           </a:prstGeom>
+          <a:solidFill>
+            <a:schemeClr val="bg1">
+              <a:lumMod val="75000"/>
+              <a:lumOff val="25000"/>
+              <a:alpha val="0"/>
+            </a:schemeClr>
+          </a:solidFill>
         </p:spPr>
       </p:pic>
+      <p:sp>
+        <p:nvSpPr>
+          <p:cNvPr id="3" name="TextBox 2">
+            <a:extLst>
+              <a:ext uri="{FF2B5EF4-FFF2-40B4-BE49-F238E27FC236}">
+                <a16:creationId xmlns:a16="http://schemas.microsoft.com/office/drawing/2014/main" id="{197E1D42-56D6-ED99-3573-0F6E9CD32C08}"/>
+              </a:ext>
+            </a:extLst>
+          </p:cNvPr>
+          <p:cNvSpPr txBox="1"/>
+          <p:nvPr/>
+        </p:nvSpPr>
+        <p:spPr>
+          <a:xfrm>
+            <a:off x="984868" y="58846"/>
+            <a:ext cx="10587804" cy="7017306"/>
+          </a:xfrm>
+          <a:prstGeom prst="rect">
+            <a:avLst/>
+          </a:prstGeom>
+          <a:solidFill>
+            <a:schemeClr val="bg1">
+              <a:lumMod val="75000"/>
+              <a:lumOff val="25000"/>
+              <a:alpha val="50000"/>
+            </a:schemeClr>
+          </a:solidFill>
+        </p:spPr>
+        <p:txBody>
+          <a:bodyPr wrap="square" rtlCol="0">
+            <a:spAutoFit/>
+          </a:bodyPr>
+          <a:lstStyle/>
+          <a:p>
+            <a:r>
+              <a:rPr lang="en-US" dirty="0"/>
+              <a:t>   </a:t>
+            </a:r>
+          </a:p>
+          <a:p>
+            <a:endParaRPr lang="en-US" dirty="0"/>
+          </a:p>
+          <a:p>
+            <a:endParaRPr lang="en-US" dirty="0"/>
+          </a:p>
+          <a:p>
+            <a:endParaRPr lang="en-US" dirty="0"/>
+          </a:p>
+          <a:p>
+            <a:endParaRPr lang="en-US" dirty="0"/>
+          </a:p>
+          <a:p>
+            <a:endParaRPr lang="en-US" dirty="0"/>
+          </a:p>
+          <a:p>
+            <a:endParaRPr lang="en-US" dirty="0"/>
+          </a:p>
+          <a:p>
+            <a:endParaRPr lang="en-US" dirty="0"/>
+          </a:p>
+          <a:p>
+            <a:endParaRPr lang="en-US" dirty="0"/>
+          </a:p>
+          <a:p>
+            <a:endParaRPr lang="en-US" dirty="0"/>
+          </a:p>
+          <a:p>
+            <a:endParaRPr lang="en-US" dirty="0"/>
+          </a:p>
+          <a:p>
+            <a:endParaRPr lang="en-US" dirty="0"/>
+          </a:p>
+          <a:p>
+            <a:endParaRPr lang="en-US" dirty="0"/>
+          </a:p>
+          <a:p>
+            <a:endParaRPr lang="en-US" dirty="0"/>
+          </a:p>
+          <a:p>
+            <a:endParaRPr lang="en-US" dirty="0"/>
+          </a:p>
+          <a:p>
+            <a:endParaRPr lang="en-US" dirty="0"/>
+          </a:p>
+          <a:p>
+            <a:endParaRPr lang="en-US" dirty="0"/>
+          </a:p>
+          <a:p>
+            <a:endParaRPr lang="en-US" dirty="0"/>
+          </a:p>
+          <a:p>
+            <a:endParaRPr lang="en-US" dirty="0"/>
+          </a:p>
+          <a:p>
+            <a:endParaRPr lang="en-US" dirty="0"/>
+          </a:p>
+          <a:p>
+            <a:endParaRPr lang="en-US" dirty="0"/>
+          </a:p>
+          <a:p>
+            <a:endParaRPr lang="en-US" dirty="0"/>
+          </a:p>
+          <a:p>
+            <a:endParaRPr lang="en-US" dirty="0"/>
+          </a:p>
+          <a:p>
+            <a:endParaRPr lang="en-US" dirty="0"/>
+          </a:p>
+          <a:p>
+            <a:endParaRPr lang="en-US" dirty="0"/>
+          </a:p>
+        </p:txBody>
+      </p:sp>
       <p:sp>
         <p:nvSpPr>
           <p:cNvPr id="6" name="TextBox 5">
@@ -6299,7 +6419,7 @@
         </p:nvSpPr>
         <p:spPr>
           <a:xfrm>
-            <a:off x="6096000" y="2500008"/>
+            <a:off x="5820384" y="2274837"/>
             <a:ext cx="5476672" cy="2585323"/>
           </a:xfrm>
           <a:prstGeom prst="rect">
@@ -6468,6 +6588,155 @@
       </p:pic>
       <p:sp>
         <p:nvSpPr>
+          <p:cNvPr id="2" name="TextBox 1">
+            <a:extLst>
+              <a:ext uri="{FF2B5EF4-FFF2-40B4-BE49-F238E27FC236}">
+                <a16:creationId xmlns:a16="http://schemas.microsoft.com/office/drawing/2014/main" id="{54D1F510-FF54-5F46-B475-3EDD96B3C68E}"/>
+              </a:ext>
+            </a:extLst>
+          </p:cNvPr>
+          <p:cNvSpPr txBox="1"/>
+          <p:nvPr/>
+        </p:nvSpPr>
+        <p:spPr>
+          <a:xfrm>
+            <a:off x="1556426" y="661481"/>
+            <a:ext cx="45719" cy="369332"/>
+          </a:xfrm>
+          <a:prstGeom prst="rect">
+            <a:avLst/>
+          </a:prstGeom>
+          <a:noFill/>
+        </p:spPr>
+        <p:txBody>
+          <a:bodyPr wrap="square" rtlCol="0">
+            <a:spAutoFit/>
+          </a:bodyPr>
+          <a:lstStyle/>
+          <a:p>
+            <a:endParaRPr lang="en-US" dirty="0"/>
+          </a:p>
+        </p:txBody>
+      </p:sp>
+      <p:sp>
+        <p:nvSpPr>
+          <p:cNvPr id="5" name="TextBox 4">
+            <a:extLst>
+              <a:ext uri="{FF2B5EF4-FFF2-40B4-BE49-F238E27FC236}">
+                <a16:creationId xmlns:a16="http://schemas.microsoft.com/office/drawing/2014/main" id="{7DEB4000-8844-6EF6-A34D-A062471BE0A7}"/>
+              </a:ext>
+            </a:extLst>
+          </p:cNvPr>
+          <p:cNvSpPr txBox="1"/>
+          <p:nvPr/>
+        </p:nvSpPr>
+        <p:spPr>
+          <a:xfrm>
+            <a:off x="989268" y="0"/>
+            <a:ext cx="10392094" cy="6740307"/>
+          </a:xfrm>
+          <a:prstGeom prst="rect">
+            <a:avLst/>
+          </a:prstGeom>
+          <a:gradFill>
+            <a:gsLst>
+              <a:gs pos="100000">
+                <a:schemeClr val="bg1">
+                  <a:lumMod val="95000"/>
+                  <a:lumOff val="5000"/>
+                  <a:alpha val="41000"/>
+                </a:schemeClr>
+              </a:gs>
+              <a:gs pos="100000">
+                <a:schemeClr val="bg1">
+                  <a:alpha val="0"/>
+                </a:schemeClr>
+              </a:gs>
+            </a:gsLst>
+            <a:lin ang="5400000" scaled="1"/>
+          </a:gradFill>
+        </p:spPr>
+        <p:txBody>
+          <a:bodyPr wrap="square" rtlCol="0">
+            <a:spAutoFit/>
+          </a:bodyPr>
+          <a:lstStyle/>
+          <a:p>
+            <a:endParaRPr lang="en-US" dirty="0"/>
+          </a:p>
+          <a:p>
+            <a:endParaRPr lang="en-US" dirty="0"/>
+          </a:p>
+          <a:p>
+            <a:endParaRPr lang="en-US" dirty="0"/>
+          </a:p>
+          <a:p>
+            <a:endParaRPr lang="en-US" dirty="0"/>
+          </a:p>
+          <a:p>
+            <a:endParaRPr lang="en-US" dirty="0"/>
+          </a:p>
+          <a:p>
+            <a:endParaRPr lang="en-US" dirty="0"/>
+          </a:p>
+          <a:p>
+            <a:endParaRPr lang="en-US" dirty="0"/>
+          </a:p>
+          <a:p>
+            <a:endParaRPr lang="en-US" dirty="0"/>
+          </a:p>
+          <a:p>
+            <a:endParaRPr lang="en-US" dirty="0"/>
+          </a:p>
+          <a:p>
+            <a:endParaRPr lang="en-US" dirty="0"/>
+          </a:p>
+          <a:p>
+            <a:endParaRPr lang="en-US" dirty="0"/>
+          </a:p>
+          <a:p>
+            <a:endParaRPr lang="en-US" dirty="0"/>
+          </a:p>
+          <a:p>
+            <a:endParaRPr lang="en-US" dirty="0"/>
+          </a:p>
+          <a:p>
+            <a:endParaRPr lang="en-US" dirty="0"/>
+          </a:p>
+          <a:p>
+            <a:endParaRPr lang="en-US" dirty="0"/>
+          </a:p>
+          <a:p>
+            <a:endParaRPr lang="en-US" dirty="0"/>
+          </a:p>
+          <a:p>
+            <a:endParaRPr lang="en-US" dirty="0"/>
+          </a:p>
+          <a:p>
+            <a:endParaRPr lang="en-US" dirty="0"/>
+          </a:p>
+          <a:p>
+            <a:endParaRPr lang="en-US" dirty="0"/>
+          </a:p>
+          <a:p>
+            <a:endParaRPr lang="en-US" dirty="0"/>
+          </a:p>
+          <a:p>
+            <a:endParaRPr lang="en-US" dirty="0"/>
+          </a:p>
+          <a:p>
+            <a:endParaRPr lang="en-US" dirty="0"/>
+          </a:p>
+          <a:p>
+            <a:endParaRPr lang="en-US" dirty="0"/>
+          </a:p>
+          <a:p>
+            <a:endParaRPr lang="en-US" dirty="0"/>
+          </a:p>
+        </p:txBody>
+      </p:sp>
+      <p:sp>
+        <p:nvSpPr>
           <p:cNvPr id="4" name="TextBox 3">
             <a:extLst>
               <a:ext uri="{FF2B5EF4-FFF2-40B4-BE49-F238E27FC236}">
@@ -6480,7 +6749,7 @@
         </p:nvSpPr>
         <p:spPr>
           <a:xfrm>
-            <a:off x="5168630" y="2188723"/>
+            <a:off x="5265906" y="1259175"/>
             <a:ext cx="6300280" cy="3693319"/>
           </a:xfrm>
           <a:prstGeom prst="rect">

</xml_diff>